<commit_message>
docs: Add zkVM roadmap with prioritized implementation plan
- Update presentation with reorganized priorities (Poseidon #1, CUDA #2, AVX-512 #3, Query #4)
- Add detailed ZKVM_ROADMAP.md with phased planning for all 4 components
- Generate PDF version with table of contents
- Include technical obstacles, bibliography, and testing stages for each phase

Key sections:
- Phase 1: Poseidon Hash (6-10 weeks) - enables efficient recursion
- Phase 2: CUDA Backend (3-6 months) - 10-100x proof generation speedup
- Phase 3: AVX-512 Variants (2-3 weeks) - 2x incremental CPU speedup
- Phase 4: FRI Query Phase (4-6 weeks) - completes the protocol

Co-Authored-By: Claude Opus 4.5 <noreply@anthropic.com>
</commit_message>
<xml_diff>
--- a/docs/AMO-Lean_Technical_Presentation.pptx
+++ b/docs/AMO-Lean_Technical_Presentation.pptx
@@ -23,6 +23,8 @@
     <p:sldId id="271" r:id="rId22"/>
     <p:sldId id="272" r:id="rId23"/>
     <p:sldId id="273" r:id="rId24"/>
+    <p:sldId id="274" r:id="rId25"/>
+    <p:sldId id="275" r:id="rId26"/>
   </p:sldIdLst>
   <p:sldSz cx="12191695" cy="6858000" type="screen4x3"/>
   <p:notesSz cx="6858000" cy="9144000"/>
@@ -6244,21 +6246,64 @@
               </a:defRPr>
             </a:pPr>
             <a:r>
-              <a:t>Trabajo Futuro</a:t>
-            </a:r>
-          </a:p>
-        </p:txBody>
-      </p:sp>
-      <p:sp>
-        <p:nvSpPr>
-          <p:cNvPr id="4" name="TextBox 3"/>
+              <a:t>Trabajo Futuro: Ruta hacia zkVM</a:t>
+            </a:r>
+          </a:p>
+        </p:txBody>
+      </p:sp>
+      <p:sp>
+        <p:nvSpPr>
+          <p:cNvPr id="4" name="Rounded Rectangle 3"/>
+          <p:cNvSpPr/>
+          <p:nvPr/>
+        </p:nvSpPr>
+        <p:spPr>
+          <a:xfrm>
+            <a:off x="457200" y="1371600"/>
+            <a:ext cx="1645920" cy="457200"/>
+          </a:xfrm>
+          <a:prstGeom prst="roundRect">
+            <a:avLst/>
+          </a:prstGeom>
+          <a:solidFill>
+            <a:srgbClr val="7B2D8E"/>
+          </a:solidFill>
+          <a:ln>
+            <a:noFill/>
+          </a:ln>
+        </p:spPr>
+        <p:style>
+          <a:lnRef idx="1">
+            <a:schemeClr val="accent1"/>
+          </a:lnRef>
+          <a:fillRef idx="3">
+            <a:schemeClr val="accent1"/>
+          </a:fillRef>
+          <a:effectRef idx="2">
+            <a:schemeClr val="accent1"/>
+          </a:effectRef>
+          <a:fontRef idx="minor">
+            <a:schemeClr val="lt1"/>
+          </a:fontRef>
+        </p:style>
+        <p:txBody>
+          <a:bodyPr rtlCol="0" anchor="ctr"/>
+          <a:lstStyle/>
+          <a:p>
+            <a:pPr algn="ctr"/>
+          </a:p>
+        </p:txBody>
+      </p:sp>
+      <p:sp>
+        <p:nvSpPr>
+          <p:cNvPr id="5" name="TextBox 4"/>
           <p:cNvSpPr txBox="1"/>
           <p:nvPr/>
         </p:nvSpPr>
         <p:spPr>
           <a:xfrm>
-            <a:off x="457200" y="1371600"/>
-            <a:ext cx="10972800" cy="5029200"/>
+            <a:off x="457200" y="1444752"/>
+            <a:ext cx="1645920" cy="365760"/>
           </a:xfrm>
           <a:prstGeom prst="rect">
             <a:avLst/>
@@ -6266,188 +6311,709 @@
           <a:noFill/>
         </p:spPr>
         <p:txBody>
-          <a:bodyPr wrap="square">
+          <a:bodyPr wrap="none">
             <a:spAutoFit/>
           </a:bodyPr>
           <a:lstStyle/>
           <a:p>
-            <a:pPr>
-              <a:spcAft>
-                <a:spcPts val="1200"/>
-              </a:spcAft>
-              <a:defRPr sz="2000">
-                <a:solidFill>
-                  <a:srgbClr val="333333"/>
-                </a:solidFill>
-              </a:defRPr>
-            </a:pPr>
-            <a:r>
-              <a:t>Corto plazo:</a:t>
-            </a:r>
-          </a:p>
-          <a:p>
-            <a:pPr lvl="1">
-              <a:spcAft>
-                <a:spcPts val="1200"/>
-              </a:spcAft>
-              <a:defRPr sz="2000">
-                <a:solidFill>
-                  <a:srgbClr val="333333"/>
-                </a:solidFill>
-              </a:defRPr>
-            </a:pPr>
-            <a:r>
-              <a:t>Completar teoremas con sorry pendientes</a:t>
-            </a:r>
-          </a:p>
-          <a:p>
-            <a:pPr lvl="1">
-              <a:spcAft>
-                <a:spcPts val="1200"/>
-              </a:spcAft>
-              <a:defRPr sz="2000">
-                <a:solidFill>
-                  <a:srgbClr val="333333"/>
-                </a:solidFill>
-              </a:defRPr>
-            </a:pPr>
-            <a:r>
-              <a:t>Mas vectores de test para fuzzing</a:t>
-            </a:r>
-          </a:p>
-          <a:p>
-            <a:pPr lvl="1">
-              <a:spcAft>
-                <a:spcPts val="1200"/>
-              </a:spcAft>
-              <a:defRPr sz="2000">
-                <a:solidFill>
-                  <a:srgbClr val="333333"/>
-                </a:solidFill>
-              </a:defRPr>
-            </a:pPr>
-            <a:r>
-              <a:t>Variantes AVX-512 de kernels</a:t>
-            </a:r>
-          </a:p>
-          <a:p>
-            <a:pPr>
-              <a:spcAft>
-                <a:spcPts val="1200"/>
-              </a:spcAft>
-              <a:defRPr sz="2000">
-                <a:solidFill>
-                  <a:srgbClr val="333333"/>
-                </a:solidFill>
-              </a:defRPr>
-            </a:pPr>
-            <a:r>
-              <a:t>Mediano plazo:</a:t>
-            </a:r>
-          </a:p>
-          <a:p>
-            <a:pPr lvl="1">
-              <a:spcAft>
-                <a:spcPts val="1200"/>
-              </a:spcAft>
-              <a:defRPr sz="2000">
-                <a:solidFill>
-                  <a:srgbClr val="333333"/>
-                </a:solidFill>
-              </a:defRPr>
-            </a:pPr>
-            <a:r>
-              <a:t>Integrar hash criptografico real (Poseidon)</a:t>
-            </a:r>
-          </a:p>
-          <a:p>
-            <a:pPr lvl="1">
-              <a:spcAft>
-                <a:spcPts val="1200"/>
-              </a:spcAft>
-              <a:defRPr sz="2000">
-                <a:solidFill>
-                  <a:srgbClr val="333333"/>
-                </a:solidFill>
-              </a:defRPr>
-            </a:pPr>
-            <a:r>
-              <a:t>Query phase de FRI (no solo commit)</a:t>
-            </a:r>
-          </a:p>
-          <a:p>
-            <a:pPr lvl="1">
-              <a:spcAft>
-                <a:spcPts val="1200"/>
-              </a:spcAft>
-              <a:defRPr sz="2000">
-                <a:solidFill>
-                  <a:srgbClr val="333333"/>
-                </a:solidFill>
-              </a:defRPr>
-            </a:pPr>
-            <a:r>
-              <a:t>Extender a STARK prover completo</a:t>
-            </a:r>
-          </a:p>
-          <a:p>
-            <a:pPr>
-              <a:spcAft>
-                <a:spcPts val="1200"/>
-              </a:spcAft>
-              <a:defRPr sz="2000">
-                <a:solidFill>
-                  <a:srgbClr val="333333"/>
-                </a:solidFill>
-              </a:defRPr>
-            </a:pPr>
-            <a:r>
-              <a:t>Largo plazo:</a:t>
-            </a:r>
-          </a:p>
-          <a:p>
-            <a:pPr lvl="1">
-              <a:spcAft>
-                <a:spcPts val="1200"/>
-              </a:spcAft>
-              <a:defRPr sz="2000">
-                <a:solidFill>
-                  <a:srgbClr val="333333"/>
-                </a:solidFill>
-              </a:defRPr>
-            </a:pPr>
-            <a:r>
-              <a:t>Verificacion formal de codigo C (CompCert-style)</a:t>
-            </a:r>
-          </a:p>
-          <a:p>
-            <a:pPr lvl="1">
-              <a:spcAft>
-                <a:spcPts val="1200"/>
-              </a:spcAft>
-              <a:defRPr sz="2000">
-                <a:solidFill>
-                  <a:srgbClr val="333333"/>
-                </a:solidFill>
-              </a:defRPr>
-            </a:pPr>
-            <a:r>
-              <a:t>Generacion de codigo GPU (CUDA/Metal)</a:t>
-            </a:r>
-          </a:p>
-          <a:p>
-            <a:pPr lvl="1">
-              <a:spcAft>
-                <a:spcPts val="1200"/>
-              </a:spcAft>
-              <a:defRPr sz="2000">
-                <a:solidFill>
-                  <a:srgbClr val="333333"/>
-                </a:solidFill>
-              </a:defRPr>
-            </a:pPr>
-            <a:r>
-              <a:t>Integracion con sistemas ZK de produccion</a:t>
+            <a:pPr algn="ctr">
+              <a:defRPr sz="1400" b="1">
+                <a:solidFill>
+                  <a:srgbClr val="FFFFFF"/>
+                </a:solidFill>
+              </a:defRPr>
+            </a:pPr>
+            <a:r>
+              <a:t>#1 CRÍTICO</a:t>
+            </a:r>
+          </a:p>
+        </p:txBody>
+      </p:sp>
+      <p:sp>
+        <p:nvSpPr>
+          <p:cNvPr id="6" name="TextBox 5"/>
+          <p:cNvSpPr txBox="1"/>
+          <p:nvPr/>
+        </p:nvSpPr>
+        <p:spPr>
+          <a:xfrm>
+            <a:off x="2286000" y="1371600"/>
+            <a:ext cx="3657600" cy="457200"/>
+          </a:xfrm>
+          <a:prstGeom prst="rect">
+            <a:avLst/>
+          </a:prstGeom>
+          <a:noFill/>
+        </p:spPr>
+        <p:txBody>
+          <a:bodyPr wrap="none">
+            <a:spAutoFit/>
+          </a:bodyPr>
+          <a:lstStyle/>
+          <a:p>
+            <a:pPr>
+              <a:defRPr sz="2200" b="1">
+                <a:solidFill>
+                  <a:srgbClr val="1A365D"/>
+                </a:solidFill>
+              </a:defRPr>
+            </a:pPr>
+            <a:r>
+              <a:t>Poseidon/Rescue Hash</a:t>
+            </a:r>
+          </a:p>
+        </p:txBody>
+      </p:sp>
+      <p:sp>
+        <p:nvSpPr>
+          <p:cNvPr id="7" name="TextBox 6"/>
+          <p:cNvSpPr txBox="1"/>
+          <p:nvPr/>
+        </p:nvSpPr>
+        <p:spPr>
+          <a:xfrm>
+            <a:off x="2286000" y="1828800"/>
+            <a:ext cx="1828800" cy="365760"/>
+          </a:xfrm>
+          <a:prstGeom prst="rect">
+            <a:avLst/>
+          </a:prstGeom>
+          <a:noFill/>
+        </p:spPr>
+        <p:txBody>
+          <a:bodyPr wrap="none">
+            <a:spAutoFit/>
+          </a:bodyPr>
+          <a:lstStyle/>
+          <a:p>
+            <a:pPr>
+              <a:defRPr sz="1400">
+                <a:solidFill>
+                  <a:srgbClr val="666666"/>
+                </a:solidFill>
+              </a:defRPr>
+            </a:pPr>
+            <a:r>
+              <a:t>⏱ 6-10 semanas</a:t>
+            </a:r>
+          </a:p>
+        </p:txBody>
+      </p:sp>
+      <p:sp>
+        <p:nvSpPr>
+          <p:cNvPr id="8" name="TextBox 7"/>
+          <p:cNvSpPr txBox="1"/>
+          <p:nvPr/>
+        </p:nvSpPr>
+        <p:spPr>
+          <a:xfrm>
+            <a:off x="2286000" y="2148840"/>
+            <a:ext cx="9144000" cy="365760"/>
+          </a:xfrm>
+          <a:prstGeom prst="rect">
+            <a:avLst/>
+          </a:prstGeom>
+          <a:noFill/>
+        </p:spPr>
+        <p:txBody>
+          <a:bodyPr wrap="none">
+            <a:spAutoFit/>
+          </a:bodyPr>
+          <a:lstStyle/>
+          <a:p>
+            <a:pPr>
+              <a:defRPr sz="1600">
+                <a:solidFill>
+                  <a:srgbClr val="444444"/>
+                </a:solidFill>
+              </a:defRPr>
+            </a:pPr>
+            <a:r>
+              <a:t>Habilita recursion eficiente en zkVM</a:t>
+            </a:r>
+          </a:p>
+        </p:txBody>
+      </p:sp>
+      <p:sp>
+        <p:nvSpPr>
+          <p:cNvPr id="9" name="Rounded Rectangle 8"/>
+          <p:cNvSpPr/>
+          <p:nvPr/>
+        </p:nvSpPr>
+        <p:spPr>
+          <a:xfrm>
+            <a:off x="457200" y="2697480"/>
+            <a:ext cx="1645920" cy="457200"/>
+          </a:xfrm>
+          <a:prstGeom prst="roundRect">
+            <a:avLst/>
+          </a:prstGeom>
+          <a:solidFill>
+            <a:srgbClr val="C9302C"/>
+          </a:solidFill>
+          <a:ln>
+            <a:noFill/>
+          </a:ln>
+        </p:spPr>
+        <p:style>
+          <a:lnRef idx="1">
+            <a:schemeClr val="accent1"/>
+          </a:lnRef>
+          <a:fillRef idx="3">
+            <a:schemeClr val="accent1"/>
+          </a:fillRef>
+          <a:effectRef idx="2">
+            <a:schemeClr val="accent1"/>
+          </a:effectRef>
+          <a:fontRef idx="minor">
+            <a:schemeClr val="lt1"/>
+          </a:fontRef>
+        </p:style>
+        <p:txBody>
+          <a:bodyPr rtlCol="0" anchor="ctr"/>
+          <a:lstStyle/>
+          <a:p>
+            <a:pPr algn="ctr"/>
+          </a:p>
+        </p:txBody>
+      </p:sp>
+      <p:sp>
+        <p:nvSpPr>
+          <p:cNvPr id="10" name="TextBox 9"/>
+          <p:cNvSpPr txBox="1"/>
+          <p:nvPr/>
+        </p:nvSpPr>
+        <p:spPr>
+          <a:xfrm>
+            <a:off x="457200" y="2770632"/>
+            <a:ext cx="1645920" cy="365760"/>
+          </a:xfrm>
+          <a:prstGeom prst="rect">
+            <a:avLst/>
+          </a:prstGeom>
+          <a:noFill/>
+        </p:spPr>
+        <p:txBody>
+          <a:bodyPr wrap="none">
+            <a:spAutoFit/>
+          </a:bodyPr>
+          <a:lstStyle/>
+          <a:p>
+            <a:pPr algn="ctr">
+              <a:defRPr sz="1400" b="1">
+                <a:solidFill>
+                  <a:srgbClr val="FFFFFF"/>
+                </a:solidFill>
+              </a:defRPr>
+            </a:pPr>
+            <a:r>
+              <a:t>#2 ALTO</a:t>
+            </a:r>
+          </a:p>
+        </p:txBody>
+      </p:sp>
+      <p:sp>
+        <p:nvSpPr>
+          <p:cNvPr id="11" name="TextBox 10"/>
+          <p:cNvSpPr txBox="1"/>
+          <p:nvPr/>
+        </p:nvSpPr>
+        <p:spPr>
+          <a:xfrm>
+            <a:off x="2286000" y="2697480"/>
+            <a:ext cx="3657600" cy="457200"/>
+          </a:xfrm>
+          <a:prstGeom prst="rect">
+            <a:avLst/>
+          </a:prstGeom>
+          <a:noFill/>
+        </p:spPr>
+        <p:txBody>
+          <a:bodyPr wrap="none">
+            <a:spAutoFit/>
+          </a:bodyPr>
+          <a:lstStyle/>
+          <a:p>
+            <a:pPr>
+              <a:defRPr sz="2200" b="1">
+                <a:solidFill>
+                  <a:srgbClr val="1A365D"/>
+                </a:solidFill>
+              </a:defRPr>
+            </a:pPr>
+            <a:r>
+              <a:t>Backend CUDA/GPU</a:t>
+            </a:r>
+          </a:p>
+        </p:txBody>
+      </p:sp>
+      <p:sp>
+        <p:nvSpPr>
+          <p:cNvPr id="12" name="TextBox 11"/>
+          <p:cNvSpPr txBox="1"/>
+          <p:nvPr/>
+        </p:nvSpPr>
+        <p:spPr>
+          <a:xfrm>
+            <a:off x="2286000" y="3154680"/>
+            <a:ext cx="1828800" cy="365760"/>
+          </a:xfrm>
+          <a:prstGeom prst="rect">
+            <a:avLst/>
+          </a:prstGeom>
+          <a:noFill/>
+        </p:spPr>
+        <p:txBody>
+          <a:bodyPr wrap="none">
+            <a:spAutoFit/>
+          </a:bodyPr>
+          <a:lstStyle/>
+          <a:p>
+            <a:pPr>
+              <a:defRPr sz="1400">
+                <a:solidFill>
+                  <a:srgbClr val="666666"/>
+                </a:solidFill>
+              </a:defRPr>
+            </a:pPr>
+            <a:r>
+              <a:t>⏱ 3-6 meses</a:t>
+            </a:r>
+          </a:p>
+        </p:txBody>
+      </p:sp>
+      <p:sp>
+        <p:nvSpPr>
+          <p:cNvPr id="13" name="TextBox 12"/>
+          <p:cNvSpPr txBox="1"/>
+          <p:nvPr/>
+        </p:nvSpPr>
+        <p:spPr>
+          <a:xfrm>
+            <a:off x="2286000" y="3474720"/>
+            <a:ext cx="9144000" cy="365760"/>
+          </a:xfrm>
+          <a:prstGeom prst="rect">
+            <a:avLst/>
+          </a:prstGeom>
+          <a:noFill/>
+        </p:spPr>
+        <p:txBody>
+          <a:bodyPr wrap="none">
+            <a:spAutoFit/>
+          </a:bodyPr>
+          <a:lstStyle/>
+          <a:p>
+            <a:pPr>
+              <a:defRPr sz="1600">
+                <a:solidFill>
+                  <a:srgbClr val="444444"/>
+                </a:solidFill>
+              </a:defRPr>
+            </a:pPr>
+            <a:r>
+              <a:t>Proof generation en granjas GPU</a:t>
+            </a:r>
+          </a:p>
+        </p:txBody>
+      </p:sp>
+      <p:sp>
+        <p:nvSpPr>
+          <p:cNvPr id="14" name="Rounded Rectangle 13"/>
+          <p:cNvSpPr/>
+          <p:nvPr/>
+        </p:nvSpPr>
+        <p:spPr>
+          <a:xfrm>
+            <a:off x="457200" y="4023360"/>
+            <a:ext cx="1645920" cy="457200"/>
+          </a:xfrm>
+          <a:prstGeom prst="roundRect">
+            <a:avLst/>
+          </a:prstGeom>
+          <a:solidFill>
+            <a:srgbClr val="F27F1B"/>
+          </a:solidFill>
+          <a:ln>
+            <a:noFill/>
+          </a:ln>
+        </p:spPr>
+        <p:style>
+          <a:lnRef idx="1">
+            <a:schemeClr val="accent1"/>
+          </a:lnRef>
+          <a:fillRef idx="3">
+            <a:schemeClr val="accent1"/>
+          </a:fillRef>
+          <a:effectRef idx="2">
+            <a:schemeClr val="accent1"/>
+          </a:effectRef>
+          <a:fontRef idx="minor">
+            <a:schemeClr val="lt1"/>
+          </a:fontRef>
+        </p:style>
+        <p:txBody>
+          <a:bodyPr rtlCol="0" anchor="ctr"/>
+          <a:lstStyle/>
+          <a:p>
+            <a:pPr algn="ctr"/>
+          </a:p>
+        </p:txBody>
+      </p:sp>
+      <p:sp>
+        <p:nvSpPr>
+          <p:cNvPr id="15" name="TextBox 14"/>
+          <p:cNvSpPr txBox="1"/>
+          <p:nvPr/>
+        </p:nvSpPr>
+        <p:spPr>
+          <a:xfrm>
+            <a:off x="457200" y="4096512"/>
+            <a:ext cx="1645920" cy="365760"/>
+          </a:xfrm>
+          <a:prstGeom prst="rect">
+            <a:avLst/>
+          </a:prstGeom>
+          <a:noFill/>
+        </p:spPr>
+        <p:txBody>
+          <a:bodyPr wrap="none">
+            <a:spAutoFit/>
+          </a:bodyPr>
+          <a:lstStyle/>
+          <a:p>
+            <a:pPr algn="ctr">
+              <a:defRPr sz="1400" b="1">
+                <a:solidFill>
+                  <a:srgbClr val="FFFFFF"/>
+                </a:solidFill>
+              </a:defRPr>
+            </a:pPr>
+            <a:r>
+              <a:t>#3 MEDIO</a:t>
+            </a:r>
+          </a:p>
+        </p:txBody>
+      </p:sp>
+      <p:sp>
+        <p:nvSpPr>
+          <p:cNvPr id="16" name="TextBox 15"/>
+          <p:cNvSpPr txBox="1"/>
+          <p:nvPr/>
+        </p:nvSpPr>
+        <p:spPr>
+          <a:xfrm>
+            <a:off x="2286000" y="4023360"/>
+            <a:ext cx="3657600" cy="457200"/>
+          </a:xfrm>
+          <a:prstGeom prst="rect">
+            <a:avLst/>
+          </a:prstGeom>
+          <a:noFill/>
+        </p:spPr>
+        <p:txBody>
+          <a:bodyPr wrap="none">
+            <a:spAutoFit/>
+          </a:bodyPr>
+          <a:lstStyle/>
+          <a:p>
+            <a:pPr>
+              <a:defRPr sz="2200" b="1">
+                <a:solidFill>
+                  <a:srgbClr val="1A365D"/>
+                </a:solidFill>
+              </a:defRPr>
+            </a:pPr>
+            <a:r>
+              <a:t>Variantes AVX-512</a:t>
+            </a:r>
+          </a:p>
+        </p:txBody>
+      </p:sp>
+      <p:sp>
+        <p:nvSpPr>
+          <p:cNvPr id="17" name="TextBox 16"/>
+          <p:cNvSpPr txBox="1"/>
+          <p:nvPr/>
+        </p:nvSpPr>
+        <p:spPr>
+          <a:xfrm>
+            <a:off x="2286000" y="4480560"/>
+            <a:ext cx="1828800" cy="365760"/>
+          </a:xfrm>
+          <a:prstGeom prst="rect">
+            <a:avLst/>
+          </a:prstGeom>
+          <a:noFill/>
+        </p:spPr>
+        <p:txBody>
+          <a:bodyPr wrap="none">
+            <a:spAutoFit/>
+          </a:bodyPr>
+          <a:lstStyle/>
+          <a:p>
+            <a:pPr>
+              <a:defRPr sz="1400">
+                <a:solidFill>
+                  <a:srgbClr val="666666"/>
+                </a:solidFill>
+              </a:defRPr>
+            </a:pPr>
+            <a:r>
+              <a:t>⏱ 2-3 semanas</a:t>
+            </a:r>
+          </a:p>
+        </p:txBody>
+      </p:sp>
+      <p:sp>
+        <p:nvSpPr>
+          <p:cNvPr id="18" name="TextBox 17"/>
+          <p:cNvSpPr txBox="1"/>
+          <p:nvPr/>
+        </p:nvSpPr>
+        <p:spPr>
+          <a:xfrm>
+            <a:off x="2286000" y="4800600"/>
+            <a:ext cx="9144000" cy="365760"/>
+          </a:xfrm>
+          <a:prstGeom prst="rect">
+            <a:avLst/>
+          </a:prstGeom>
+          <a:noFill/>
+        </p:spPr>
+        <p:txBody>
+          <a:bodyPr wrap="none">
+            <a:spAutoFit/>
+          </a:bodyPr>
+          <a:lstStyle/>
+          <a:p>
+            <a:pPr>
+              <a:defRPr sz="1600">
+                <a:solidFill>
+                  <a:srgbClr val="444444"/>
+                </a:solidFill>
+              </a:defRPr>
+            </a:pPr>
+            <a:r>
+              <a:t>Optimizacion incremental CPU</a:t>
+            </a:r>
+          </a:p>
+        </p:txBody>
+      </p:sp>
+      <p:sp>
+        <p:nvSpPr>
+          <p:cNvPr id="19" name="Rounded Rectangle 18"/>
+          <p:cNvSpPr/>
+          <p:nvPr/>
+        </p:nvSpPr>
+        <p:spPr>
+          <a:xfrm>
+            <a:off x="457200" y="5349240"/>
+            <a:ext cx="1645920" cy="457200"/>
+          </a:xfrm>
+          <a:prstGeom prst="roundRect">
+            <a:avLst/>
+          </a:prstGeom>
+          <a:solidFill>
+            <a:srgbClr val="2E86AB"/>
+          </a:solidFill>
+          <a:ln>
+            <a:noFill/>
+          </a:ln>
+        </p:spPr>
+        <p:style>
+          <a:lnRef idx="1">
+            <a:schemeClr val="accent1"/>
+          </a:lnRef>
+          <a:fillRef idx="3">
+            <a:schemeClr val="accent1"/>
+          </a:fillRef>
+          <a:effectRef idx="2">
+            <a:schemeClr val="accent1"/>
+          </a:effectRef>
+          <a:fontRef idx="minor">
+            <a:schemeClr val="lt1"/>
+          </a:fontRef>
+        </p:style>
+        <p:txBody>
+          <a:bodyPr rtlCol="0" anchor="ctr"/>
+          <a:lstStyle/>
+          <a:p>
+            <a:pPr algn="ctr"/>
+          </a:p>
+        </p:txBody>
+      </p:sp>
+      <p:sp>
+        <p:nvSpPr>
+          <p:cNvPr id="20" name="TextBox 19"/>
+          <p:cNvSpPr txBox="1"/>
+          <p:nvPr/>
+        </p:nvSpPr>
+        <p:spPr>
+          <a:xfrm>
+            <a:off x="457200" y="5422392"/>
+            <a:ext cx="1645920" cy="365760"/>
+          </a:xfrm>
+          <a:prstGeom prst="rect">
+            <a:avLst/>
+          </a:prstGeom>
+          <a:noFill/>
+        </p:spPr>
+        <p:txBody>
+          <a:bodyPr wrap="none">
+            <a:spAutoFit/>
+          </a:bodyPr>
+          <a:lstStyle/>
+          <a:p>
+            <a:pPr algn="ctr">
+              <a:defRPr sz="1400" b="1">
+                <a:solidFill>
+                  <a:srgbClr val="FFFFFF"/>
+                </a:solidFill>
+              </a:defRPr>
+            </a:pPr>
+            <a:r>
+              <a:t>#4 BAJO</a:t>
+            </a:r>
+          </a:p>
+        </p:txBody>
+      </p:sp>
+      <p:sp>
+        <p:nvSpPr>
+          <p:cNvPr id="21" name="TextBox 20"/>
+          <p:cNvSpPr txBox="1"/>
+          <p:nvPr/>
+        </p:nvSpPr>
+        <p:spPr>
+          <a:xfrm>
+            <a:off x="2286000" y="5349240"/>
+            <a:ext cx="3657600" cy="457200"/>
+          </a:xfrm>
+          <a:prstGeom prst="rect">
+            <a:avLst/>
+          </a:prstGeom>
+          <a:noFill/>
+        </p:spPr>
+        <p:txBody>
+          <a:bodyPr wrap="none">
+            <a:spAutoFit/>
+          </a:bodyPr>
+          <a:lstStyle/>
+          <a:p>
+            <a:pPr>
+              <a:defRPr sz="2200" b="1">
+                <a:solidFill>
+                  <a:srgbClr val="1A365D"/>
+                </a:solidFill>
+              </a:defRPr>
+            </a:pPr>
+            <a:r>
+              <a:t>FRI Query Phase</a:t>
+            </a:r>
+          </a:p>
+        </p:txBody>
+      </p:sp>
+      <p:sp>
+        <p:nvSpPr>
+          <p:cNvPr id="22" name="TextBox 21"/>
+          <p:cNvSpPr txBox="1"/>
+          <p:nvPr/>
+        </p:nvSpPr>
+        <p:spPr>
+          <a:xfrm>
+            <a:off x="2286000" y="5806440"/>
+            <a:ext cx="1828800" cy="365760"/>
+          </a:xfrm>
+          <a:prstGeom prst="rect">
+            <a:avLst/>
+          </a:prstGeom>
+          <a:noFill/>
+        </p:spPr>
+        <p:txBody>
+          <a:bodyPr wrap="none">
+            <a:spAutoFit/>
+          </a:bodyPr>
+          <a:lstStyle/>
+          <a:p>
+            <a:pPr>
+              <a:defRPr sz="1400">
+                <a:solidFill>
+                  <a:srgbClr val="666666"/>
+                </a:solidFill>
+              </a:defRPr>
+            </a:pPr>
+            <a:r>
+              <a:t>⏱ 4-6 semanas</a:t>
+            </a:r>
+          </a:p>
+        </p:txBody>
+      </p:sp>
+      <p:sp>
+        <p:nvSpPr>
+          <p:cNvPr id="23" name="TextBox 22"/>
+          <p:cNvSpPr txBox="1"/>
+          <p:nvPr/>
+        </p:nvSpPr>
+        <p:spPr>
+          <a:xfrm>
+            <a:off x="2286000" y="6126480"/>
+            <a:ext cx="9144000" cy="365760"/>
+          </a:xfrm>
+          <a:prstGeom prst="rect">
+            <a:avLst/>
+          </a:prstGeom>
+          <a:noFill/>
+        </p:spPr>
+        <p:txBody>
+          <a:bodyPr wrap="none">
+            <a:spAutoFit/>
+          </a:bodyPr>
+          <a:lstStyle/>
+          <a:p>
+            <a:pPr>
+              <a:defRPr sz="1600">
+                <a:solidFill>
+                  <a:srgbClr val="444444"/>
+                </a:solidFill>
+              </a:defRPr>
+            </a:pPr>
+            <a:r>
+              <a:t>Completa el protocolo</a:t>
+            </a:r>
+          </a:p>
+        </p:txBody>
+      </p:sp>
+      <p:sp>
+        <p:nvSpPr>
+          <p:cNvPr id="24" name="TextBox 23"/>
+          <p:cNvSpPr txBox="1"/>
+          <p:nvPr/>
+        </p:nvSpPr>
+        <p:spPr>
+          <a:xfrm>
+            <a:off x="457200" y="6217920"/>
+            <a:ext cx="10972800" cy="457200"/>
+          </a:xfrm>
+          <a:prstGeom prst="rect">
+            <a:avLst/>
+          </a:prstGeom>
+          <a:noFill/>
+        </p:spPr>
+        <p:txBody>
+          <a:bodyPr wrap="none">
+            <a:spAutoFit/>
+          </a:bodyPr>
+          <a:lstStyle/>
+          <a:p>
+            <a:pPr>
+              <a:defRPr sz="1400" i="1">
+                <a:solidFill>
+                  <a:srgbClr val="666666"/>
+                </a:solidFill>
+              </a:defRPr>
+            </a:pPr>
+            <a:r>
+              <a:t>Ver: docs/ZKVM_ROADMAP.pdf para planificacion detallada por fases</a:t>
             </a:r>
           </a:p>
         </p:txBody>
@@ -6836,6 +7402,502 @@
 </p:sld>
 </file>
 
+<file path=ppt/slides/slide19.xml><?xml version="1.0" encoding="utf-8"?>
+<p:sld xmlns:a="http://schemas.openxmlformats.org/drawingml/2006/main" xmlns:p="http://schemas.openxmlformats.org/presentationml/2006/main" xmlns:r="http://schemas.openxmlformats.org/officeDocument/2006/relationships">
+  <p:cSld>
+    <p:spTree>
+      <p:nvGrpSpPr>
+        <p:cNvPr id="1" name=""/>
+        <p:cNvGrpSpPr/>
+        <p:nvPr/>
+      </p:nvGrpSpPr>
+      <p:grpSpPr/>
+      <p:sp>
+        <p:nvSpPr>
+          <p:cNvPr id="2" name="Rectangle 1"/>
+          <p:cNvSpPr/>
+          <p:nvPr/>
+        </p:nvSpPr>
+        <p:spPr>
+          <a:xfrm>
+            <a:off x="0" y="0"/>
+            <a:ext cx="12191695" cy="1097280"/>
+          </a:xfrm>
+          <a:prstGeom prst="rect">
+            <a:avLst/>
+          </a:prstGeom>
+          <a:solidFill>
+            <a:srgbClr val="7B2D8E"/>
+          </a:solidFill>
+          <a:ln>
+            <a:noFill/>
+          </a:ln>
+        </p:spPr>
+        <p:style>
+          <a:lnRef idx="1">
+            <a:schemeClr val="accent1"/>
+          </a:lnRef>
+          <a:fillRef idx="3">
+            <a:schemeClr val="accent1"/>
+          </a:fillRef>
+          <a:effectRef idx="2">
+            <a:schemeClr val="accent1"/>
+          </a:effectRef>
+          <a:fontRef idx="minor">
+            <a:schemeClr val="lt1"/>
+          </a:fontRef>
+        </p:style>
+        <p:txBody>
+          <a:bodyPr rtlCol="0" anchor="ctr"/>
+          <a:lstStyle/>
+          <a:p>
+            <a:pPr algn="ctr"/>
+          </a:p>
+        </p:txBody>
+      </p:sp>
+      <p:sp>
+        <p:nvSpPr>
+          <p:cNvPr id="3" name="TextBox 2"/>
+          <p:cNvSpPr txBox="1"/>
+          <p:nvPr/>
+        </p:nvSpPr>
+        <p:spPr>
+          <a:xfrm>
+            <a:off x="457200" y="274320"/>
+            <a:ext cx="10972800" cy="731520"/>
+          </a:xfrm>
+          <a:prstGeom prst="rect">
+            <a:avLst/>
+          </a:prstGeom>
+          <a:noFill/>
+        </p:spPr>
+        <p:txBody>
+          <a:bodyPr wrap="none">
+            <a:spAutoFit/>
+          </a:bodyPr>
+          <a:lstStyle/>
+          <a:p>
+            <a:pPr>
+              <a:defRPr sz="3200" b="1">
+                <a:solidFill>
+                  <a:srgbClr val="FFFFFF"/>
+                </a:solidFill>
+              </a:defRPr>
+            </a:pPr>
+            <a:r>
+              <a:t>El Desafio Poseidon: Por que es Critico</a:t>
+            </a:r>
+          </a:p>
+        </p:txBody>
+      </p:sp>
+      <p:sp>
+        <p:nvSpPr>
+          <p:cNvPr id="4" name="TextBox 3"/>
+          <p:cNvSpPr txBox="1"/>
+          <p:nvPr/>
+        </p:nvSpPr>
+        <p:spPr>
+          <a:xfrm>
+            <a:off x="457200" y="1371600"/>
+            <a:ext cx="5029200" cy="457200"/>
+          </a:xfrm>
+          <a:prstGeom prst="rect">
+            <a:avLst/>
+          </a:prstGeom>
+          <a:noFill/>
+        </p:spPr>
+        <p:txBody>
+          <a:bodyPr wrap="none">
+            <a:spAutoFit/>
+          </a:bodyPr>
+          <a:lstStyle/>
+          <a:p>
+            <a:pPr>
+              <a:defRPr sz="2200" b="1">
+                <a:solidFill>
+                  <a:srgbClr val="1A365D"/>
+                </a:solidFill>
+              </a:defRPr>
+            </a:pPr>
+            <a:r>
+              <a:t>El Problema</a:t>
+            </a:r>
+          </a:p>
+        </p:txBody>
+      </p:sp>
+      <p:sp>
+        <p:nvSpPr>
+          <p:cNvPr id="5" name="TextBox 4"/>
+          <p:cNvSpPr txBox="1"/>
+          <p:nvPr/>
+        </p:nvSpPr>
+        <p:spPr>
+          <a:xfrm>
+            <a:off x="457200" y="1920240"/>
+            <a:ext cx="5029200" cy="2286000"/>
+          </a:xfrm>
+          <a:prstGeom prst="rect">
+            <a:avLst/>
+          </a:prstGeom>
+          <a:noFill/>
+        </p:spPr>
+        <p:txBody>
+          <a:bodyPr wrap="square">
+            <a:spAutoFit/>
+          </a:bodyPr>
+          <a:lstStyle/>
+          <a:p>
+            <a:pPr>
+              <a:spcAft>
+                <a:spcPts val="600"/>
+              </a:spcAft>
+              <a:defRPr sz="1600"/>
+            </a:pPr>
+            <a:r>
+              <a:t>Poseidon = Lineal + No-Lineal</a:t>
+            </a:r>
+          </a:p>
+          <a:p>
+            <a:pPr>
+              <a:spcAft>
+                <a:spcPts val="600"/>
+              </a:spcAft>
+              <a:defRPr sz="1600">
+                <a:solidFill>
+                  <a:srgbClr val="666666"/>
+                </a:solidFill>
+              </a:defRPr>
+            </a:pPr>
+            <a:r>
+              <a:t>  Capas MDS (matrices) ✓ Kronecker OK</a:t>
+            </a:r>
+          </a:p>
+          <a:p>
+            <a:pPr>
+              <a:spcAft>
+                <a:spcPts val="600"/>
+              </a:spcAft>
+              <a:defRPr sz="1600">
+                <a:solidFill>
+                  <a:srgbClr val="666666"/>
+                </a:solidFill>
+              </a:defRPr>
+            </a:pPr>
+            <a:r>
+              <a:t>  S-boxes (x^5) ✗ Rompe linearidad</a:t>
+            </a:r>
+          </a:p>
+          <a:p>
+            <a:pPr>
+              <a:spcAft>
+                <a:spcPts val="600"/>
+              </a:spcAft>
+              <a:defRPr sz="1600"/>
+            </a:pPr>
+            <a:r>
+              <a:t>zkVMs necesitan recursion eficiente</a:t>
+            </a:r>
+          </a:p>
+          <a:p>
+            <a:pPr>
+              <a:spcAft>
+                <a:spcPts val="600"/>
+              </a:spcAft>
+              <a:defRPr sz="1600">
+                <a:solidFill>
+                  <a:srgbClr val="666666"/>
+                </a:solidFill>
+              </a:defRPr>
+            </a:pPr>
+            <a:r>
+              <a:t>  Una prueba verifica otra prueba</a:t>
+            </a:r>
+          </a:p>
+          <a:p>
+            <a:pPr>
+              <a:spcAft>
+                <a:spcPts val="600"/>
+              </a:spcAft>
+              <a:defRPr sz="1600">
+                <a:solidFill>
+                  <a:srgbClr val="666666"/>
+                </a:solidFill>
+              </a:defRPr>
+            </a:pPr>
+            <a:r>
+              <a:t>  Hash es el cuello de botella</a:t>
+            </a:r>
+          </a:p>
+          <a:p>
+            <a:pPr>
+              <a:spcAft>
+                <a:spcPts val="600"/>
+              </a:spcAft>
+              <a:defRPr sz="1600"/>
+            </a:pPr>
+            <a:r>
+              <a:t>Sin Poseidon optimizado = zkVM lenta</a:t>
+            </a:r>
+          </a:p>
+        </p:txBody>
+      </p:sp>
+      <p:sp>
+        <p:nvSpPr>
+          <p:cNvPr id="6" name="TextBox 5"/>
+          <p:cNvSpPr txBox="1"/>
+          <p:nvPr/>
+        </p:nvSpPr>
+        <p:spPr>
+          <a:xfrm>
+            <a:off x="6217920" y="1371600"/>
+            <a:ext cx="5029200" cy="457200"/>
+          </a:xfrm>
+          <a:prstGeom prst="rect">
+            <a:avLst/>
+          </a:prstGeom>
+          <a:noFill/>
+        </p:spPr>
+        <p:txBody>
+          <a:bodyPr wrap="none">
+            <a:spAutoFit/>
+          </a:bodyPr>
+          <a:lstStyle/>
+          <a:p>
+            <a:pPr>
+              <a:defRPr sz="2200" b="1">
+                <a:solidFill>
+                  <a:srgbClr val="1A365D"/>
+                </a:solidFill>
+              </a:defRPr>
+            </a:pPr>
+            <a:r>
+              <a:t>Nuestra Solucion</a:t>
+            </a:r>
+          </a:p>
+        </p:txBody>
+      </p:sp>
+      <p:sp>
+        <p:nvSpPr>
+          <p:cNvPr id="7" name="Rounded Rectangle 6"/>
+          <p:cNvSpPr/>
+          <p:nvPr/>
+        </p:nvSpPr>
+        <p:spPr>
+          <a:xfrm>
+            <a:off x="6217920" y="1920240"/>
+            <a:ext cx="5303520" cy="3200400"/>
+          </a:xfrm>
+          <a:prstGeom prst="roundRect">
+            <a:avLst/>
+          </a:prstGeom>
+          <a:solidFill>
+            <a:srgbClr val="2D2D2D"/>
+          </a:solidFill>
+          <a:ln>
+            <a:noFill/>
+          </a:ln>
+        </p:spPr>
+        <p:style>
+          <a:lnRef idx="1">
+            <a:schemeClr val="accent1"/>
+          </a:lnRef>
+          <a:fillRef idx="3">
+            <a:schemeClr val="accent1"/>
+          </a:fillRef>
+          <a:effectRef idx="2">
+            <a:schemeClr val="accent1"/>
+          </a:effectRef>
+          <a:fontRef idx="minor">
+            <a:schemeClr val="lt1"/>
+          </a:fontRef>
+        </p:style>
+        <p:txBody>
+          <a:bodyPr rtlCol="0" anchor="ctr"/>
+          <a:lstStyle/>
+          <a:p>
+            <a:pPr algn="ctr"/>
+          </a:p>
+        </p:txBody>
+      </p:sp>
+      <p:sp>
+        <p:nvSpPr>
+          <p:cNvPr id="8" name="TextBox 7"/>
+          <p:cNvSpPr txBox="1"/>
+          <p:nvPr/>
+        </p:nvSpPr>
+        <p:spPr>
+          <a:xfrm>
+            <a:off x="6400800" y="2103120"/>
+            <a:ext cx="4937760" cy="2834640"/>
+          </a:xfrm>
+          <a:prstGeom prst="rect">
+            <a:avLst/>
+          </a:prstGeom>
+          <a:noFill/>
+        </p:spPr>
+        <p:txBody>
+          <a:bodyPr wrap="none">
+            <a:spAutoFit/>
+          </a:bodyPr>
+          <a:lstStyle/>
+          <a:p>
+            <a:pPr>
+              <a:defRPr sz="1200">
+                <a:solidFill>
+                  <a:srgbClr val="E0E0E0"/>
+                </a:solidFill>
+                <a:latin typeface="Courier New"/>
+              </a:defRPr>
+            </a:pPr>
+            <a:r>
+              <a:t>-- Extender MatExpr</a:t>
+            </a:r>
+            <a:br/>
+            <a:r>
+              <a:t>inductive MatExpr where</a:t>
+            </a:r>
+            <a:br/>
+            <a:r>
+              <a:t>  | ...existentes...</a:t>
+            </a:r>
+            <a:br/>
+            <a:r>
+              <a:t>  | elemwise : (Expr -&gt; Expr)</a:t>
+            </a:r>
+            <a:br/>
+            <a:r>
+              <a:t>             -&gt; MatExpr n n  -- NUEVO</a:t>
+            </a:r>
+            <a:br/>
+            <a:br/>
+            <a:r>
+              <a:t>-- Poseidon round</a:t>
+            </a:r>
+            <a:br/>
+            <a:r>
+              <a:t>def poseidonRound (state : MatExpr t t) :=</a:t>
+            </a:r>
+            <a:br/>
+            <a:r>
+              <a:t>  MatExpr.compose</a:t>
+            </a:r>
+            <a:br/>
+            <a:r>
+              <a:t>    (MatExpr.elemwise (x =&gt; x^5)) -- S-box</a:t>
+            </a:r>
+            <a:br/>
+            <a:r>
+              <a:t>    (MatExpr.compose</a:t>
+            </a:r>
+            <a:br/>
+            <a:r>
+              <a:t>      mdsMatrix                    -- Mezcla</a:t>
+            </a:r>
+            <a:br/>
+            <a:r>
+              <a:t>      (MatExpr.add state consts)) -- RC</a:t>
+            </a:r>
+          </a:p>
+        </p:txBody>
+      </p:sp>
+      <p:sp>
+        <p:nvSpPr>
+          <p:cNvPr id="9" name="Rounded Rectangle 8"/>
+          <p:cNvSpPr/>
+          <p:nvPr/>
+        </p:nvSpPr>
+        <p:spPr>
+          <a:xfrm>
+            <a:off x="457200" y="5303520"/>
+            <a:ext cx="11247120" cy="1097280"/>
+          </a:xfrm>
+          <a:prstGeom prst="roundRect">
+            <a:avLst/>
+          </a:prstGeom>
+          <a:solidFill>
+            <a:srgbClr val="F0F0F0"/>
+          </a:solidFill>
+          <a:ln>
+            <a:noFill/>
+          </a:ln>
+        </p:spPr>
+        <p:style>
+          <a:lnRef idx="1">
+            <a:schemeClr val="accent1"/>
+          </a:lnRef>
+          <a:fillRef idx="3">
+            <a:schemeClr val="accent1"/>
+          </a:fillRef>
+          <a:effectRef idx="2">
+            <a:schemeClr val="accent1"/>
+          </a:effectRef>
+          <a:fontRef idx="minor">
+            <a:schemeClr val="lt1"/>
+          </a:fontRef>
+        </p:style>
+        <p:txBody>
+          <a:bodyPr rtlCol="0" anchor="ctr"/>
+          <a:lstStyle/>
+          <a:p>
+            <a:pPr algn="ctr"/>
+          </a:p>
+        </p:txBody>
+      </p:sp>
+      <p:sp>
+        <p:nvSpPr>
+          <p:cNvPr id="10" name="TextBox 9"/>
+          <p:cNvSpPr txBox="1"/>
+          <p:nvPr/>
+        </p:nvSpPr>
+        <p:spPr>
+          <a:xfrm>
+            <a:off x="640080" y="5440680"/>
+            <a:ext cx="10972800" cy="914400"/>
+          </a:xfrm>
+          <a:prstGeom prst="rect">
+            <a:avLst/>
+          </a:prstGeom>
+          <a:noFill/>
+        </p:spPr>
+        <p:txBody>
+          <a:bodyPr wrap="none">
+            <a:spAutoFit/>
+          </a:bodyPr>
+          <a:lstStyle/>
+          <a:p>
+            <a:pPr>
+              <a:defRPr sz="1800" b="1">
+                <a:solidFill>
+                  <a:srgbClr val="1A365D"/>
+                </a:solidFill>
+              </a:defRPr>
+            </a:pPr>
+            <a:r>
+              <a:t>Impacto en zkVM: Con Poseidon optimizado, la recursion de pruebas pasa de minutos a segundos.</a:t>
+            </a:r>
+          </a:p>
+          <a:p>
+            <a:pPr>
+              <a:defRPr sz="1600">
+                <a:solidFill>
+                  <a:srgbClr val="444444"/>
+                </a:solidFill>
+              </a:defRPr>
+            </a:pPr>
+            <a:r>
+              <a:t>Esto habilita: verificacion en tiempo real, pruebas incrementales, rollups mas eficientes.</a:t>
+            </a:r>
+          </a:p>
+        </p:txBody>
+      </p:sp>
+    </p:spTree>
+  </p:cSld>
+  <p:clrMapOvr>
+    <a:masterClrMapping/>
+  </p:clrMapOvr>
+</p:sld>
+</file>
+
 <file path=ppt/slides/slide2.xml><?xml version="1.0" encoding="utf-8"?>
 <p:sld xmlns:a="http://schemas.openxmlformats.org/drawingml/2006/main" xmlns:p="http://schemas.openxmlformats.org/presentationml/2006/main" xmlns:r="http://schemas.openxmlformats.org/officeDocument/2006/relationships">
   <p:cSld>
@@ -7048,6 +8110,757 @@
             </a:pPr>
             <a:r>
               <a:t>Fuzzing diferencial para validar codigo C generado</a:t>
+            </a:r>
+          </a:p>
+        </p:txBody>
+      </p:sp>
+    </p:spTree>
+  </p:cSld>
+  <p:clrMapOvr>
+    <a:masterClrMapping/>
+  </p:clrMapOvr>
+</p:sld>
+</file>
+
+<file path=ppt/slides/slide20.xml><?xml version="1.0" encoding="utf-8"?>
+<p:sld xmlns:a="http://schemas.openxmlformats.org/drawingml/2006/main" xmlns:p="http://schemas.openxmlformats.org/presentationml/2006/main" xmlns:r="http://schemas.openxmlformats.org/officeDocument/2006/relationships">
+  <p:cSld>
+    <p:spTree>
+      <p:nvGrpSpPr>
+        <p:cNvPr id="1" name=""/>
+        <p:cNvGrpSpPr/>
+        <p:nvPr/>
+      </p:nvGrpSpPr>
+      <p:grpSpPr/>
+      <p:sp>
+        <p:nvSpPr>
+          <p:cNvPr id="2" name="Rectangle 1"/>
+          <p:cNvSpPr/>
+          <p:nvPr/>
+        </p:nvSpPr>
+        <p:spPr>
+          <a:xfrm>
+            <a:off x="0" y="0"/>
+            <a:ext cx="12191695" cy="1097280"/>
+          </a:xfrm>
+          <a:prstGeom prst="rect">
+            <a:avLst/>
+          </a:prstGeom>
+          <a:solidFill>
+            <a:srgbClr val="1A365D"/>
+          </a:solidFill>
+          <a:ln>
+            <a:noFill/>
+          </a:ln>
+        </p:spPr>
+        <p:style>
+          <a:lnRef idx="1">
+            <a:schemeClr val="accent1"/>
+          </a:lnRef>
+          <a:fillRef idx="3">
+            <a:schemeClr val="accent1"/>
+          </a:fillRef>
+          <a:effectRef idx="2">
+            <a:schemeClr val="accent1"/>
+          </a:effectRef>
+          <a:fontRef idx="minor">
+            <a:schemeClr val="lt1"/>
+          </a:fontRef>
+        </p:style>
+        <p:txBody>
+          <a:bodyPr rtlCol="0" anchor="ctr"/>
+          <a:lstStyle/>
+          <a:p>
+            <a:pPr algn="ctr"/>
+          </a:p>
+        </p:txBody>
+      </p:sp>
+      <p:sp>
+        <p:nvSpPr>
+          <p:cNvPr id="3" name="TextBox 2"/>
+          <p:cNvSpPr txBox="1"/>
+          <p:nvPr/>
+        </p:nvSpPr>
+        <p:spPr>
+          <a:xfrm>
+            <a:off x="457200" y="274320"/>
+            <a:ext cx="10972800" cy="731520"/>
+          </a:xfrm>
+          <a:prstGeom prst="rect">
+            <a:avLst/>
+          </a:prstGeom>
+          <a:noFill/>
+        </p:spPr>
+        <p:txBody>
+          <a:bodyPr wrap="none">
+            <a:spAutoFit/>
+          </a:bodyPr>
+          <a:lstStyle/>
+          <a:p>
+            <a:pPr>
+              <a:defRPr sz="3200" b="1">
+                <a:solidFill>
+                  <a:srgbClr val="FFFFFF"/>
+                </a:solidFill>
+              </a:defRPr>
+            </a:pPr>
+            <a:r>
+              <a:t>AMO-Lean en el Ecosistema zkVM</a:t>
+            </a:r>
+          </a:p>
+        </p:txBody>
+      </p:sp>
+      <p:sp>
+        <p:nvSpPr>
+          <p:cNvPr id="4" name="TextBox 3"/>
+          <p:cNvSpPr txBox="1"/>
+          <p:nvPr/>
+        </p:nvSpPr>
+        <p:spPr>
+          <a:xfrm>
+            <a:off x="457200" y="1371600"/>
+            <a:ext cx="10972800" cy="914400"/>
+          </a:xfrm>
+          <a:prstGeom prst="rect">
+            <a:avLst/>
+          </a:prstGeom>
+          <a:noFill/>
+        </p:spPr>
+        <p:txBody>
+          <a:bodyPr wrap="none">
+            <a:spAutoFit/>
+          </a:bodyPr>
+          <a:lstStyle/>
+          <a:p>
+            <a:pPr>
+              <a:defRPr sz="2000">
+                <a:solidFill>
+                  <a:srgbClr val="444444"/>
+                </a:solidFill>
+              </a:defRPr>
+            </a:pPr>
+            <a:r>
+              <a:t>AMO-Lean genera los primitivos criptograficos verificados que las zkVMs necesitan</a:t>
+            </a:r>
+          </a:p>
+        </p:txBody>
+      </p:sp>
+      <p:sp>
+        <p:nvSpPr>
+          <p:cNvPr id="5" name="Rounded Rectangle 4"/>
+          <p:cNvSpPr/>
+          <p:nvPr/>
+        </p:nvSpPr>
+        <p:spPr>
+          <a:xfrm>
+            <a:off x="457200" y="2286000"/>
+            <a:ext cx="5029200" cy="822960"/>
+          </a:xfrm>
+          <a:prstGeom prst="roundRect">
+            <a:avLst/>
+          </a:prstGeom>
+          <a:solidFill>
+            <a:srgbClr val="2E86AB"/>
+          </a:solidFill>
+          <a:ln>
+            <a:noFill/>
+          </a:ln>
+        </p:spPr>
+        <p:style>
+          <a:lnRef idx="1">
+            <a:schemeClr val="accent1"/>
+          </a:lnRef>
+          <a:fillRef idx="3">
+            <a:schemeClr val="accent1"/>
+          </a:fillRef>
+          <a:effectRef idx="2">
+            <a:schemeClr val="accent1"/>
+          </a:effectRef>
+          <a:fontRef idx="minor">
+            <a:schemeClr val="lt1"/>
+          </a:fontRef>
+        </p:style>
+        <p:txBody>
+          <a:bodyPr rtlCol="0" anchor="ctr"/>
+          <a:lstStyle/>
+          <a:p>
+            <a:pPr algn="ctr"/>
+          </a:p>
+        </p:txBody>
+      </p:sp>
+      <p:sp>
+        <p:nvSpPr>
+          <p:cNvPr id="6" name="TextBox 5"/>
+          <p:cNvSpPr txBox="1"/>
+          <p:nvPr/>
+        </p:nvSpPr>
+        <p:spPr>
+          <a:xfrm>
+            <a:off x="640080" y="2377440"/>
+            <a:ext cx="4572000" cy="365760"/>
+          </a:xfrm>
+          <a:prstGeom prst="rect">
+            <a:avLst/>
+          </a:prstGeom>
+          <a:noFill/>
+        </p:spPr>
+        <p:txBody>
+          <a:bodyPr wrap="none">
+            <a:spAutoFit/>
+          </a:bodyPr>
+          <a:lstStyle/>
+          <a:p>
+            <a:pPr>
+              <a:defRPr sz="1800" b="1">
+                <a:solidFill>
+                  <a:srgbClr val="FFFFFF"/>
+                </a:solidFill>
+              </a:defRPr>
+            </a:pPr>
+            <a:r>
+              <a:t>SP1 (Succinct)</a:t>
+            </a:r>
+          </a:p>
+        </p:txBody>
+      </p:sp>
+      <p:sp>
+        <p:nvSpPr>
+          <p:cNvPr id="7" name="TextBox 6"/>
+          <p:cNvSpPr txBox="1"/>
+          <p:nvPr/>
+        </p:nvSpPr>
+        <p:spPr>
+          <a:xfrm>
+            <a:off x="640080" y="2743200"/>
+            <a:ext cx="4572000" cy="365760"/>
+          </a:xfrm>
+          <a:prstGeom prst="rect">
+            <a:avLst/>
+          </a:prstGeom>
+          <a:noFill/>
+        </p:spPr>
+        <p:txBody>
+          <a:bodyPr wrap="none">
+            <a:spAutoFit/>
+          </a:bodyPr>
+          <a:lstStyle/>
+          <a:p>
+            <a:pPr>
+              <a:defRPr sz="1400">
+                <a:solidFill>
+                  <a:srgbClr val="DDDDDD"/>
+                </a:solidFill>
+              </a:defRPr>
+            </a:pPr>
+            <a:r>
+              <a:t>RISC-V zkVM, recursion via Poseidon</a:t>
+            </a:r>
+          </a:p>
+        </p:txBody>
+      </p:sp>
+      <p:sp>
+        <p:nvSpPr>
+          <p:cNvPr id="8" name="Rounded Rectangle 7"/>
+          <p:cNvSpPr/>
+          <p:nvPr/>
+        </p:nvSpPr>
+        <p:spPr>
+          <a:xfrm>
+            <a:off x="457200" y="3291840"/>
+            <a:ext cx="5029200" cy="822960"/>
+          </a:xfrm>
+          <a:prstGeom prst="roundRect">
+            <a:avLst/>
+          </a:prstGeom>
+          <a:solidFill>
+            <a:srgbClr val="2E86AB"/>
+          </a:solidFill>
+          <a:ln>
+            <a:noFill/>
+          </a:ln>
+        </p:spPr>
+        <p:style>
+          <a:lnRef idx="1">
+            <a:schemeClr val="accent1"/>
+          </a:lnRef>
+          <a:fillRef idx="3">
+            <a:schemeClr val="accent1"/>
+          </a:fillRef>
+          <a:effectRef idx="2">
+            <a:schemeClr val="accent1"/>
+          </a:effectRef>
+          <a:fontRef idx="minor">
+            <a:schemeClr val="lt1"/>
+          </a:fontRef>
+        </p:style>
+        <p:txBody>
+          <a:bodyPr rtlCol="0" anchor="ctr"/>
+          <a:lstStyle/>
+          <a:p>
+            <a:pPr algn="ctr"/>
+          </a:p>
+        </p:txBody>
+      </p:sp>
+      <p:sp>
+        <p:nvSpPr>
+          <p:cNvPr id="9" name="TextBox 8"/>
+          <p:cNvSpPr txBox="1"/>
+          <p:nvPr/>
+        </p:nvSpPr>
+        <p:spPr>
+          <a:xfrm>
+            <a:off x="640080" y="3383280"/>
+            <a:ext cx="4572000" cy="365760"/>
+          </a:xfrm>
+          <a:prstGeom prst="rect">
+            <a:avLst/>
+          </a:prstGeom>
+          <a:noFill/>
+        </p:spPr>
+        <p:txBody>
+          <a:bodyPr wrap="none">
+            <a:spAutoFit/>
+          </a:bodyPr>
+          <a:lstStyle/>
+          <a:p>
+            <a:pPr>
+              <a:defRPr sz="1800" b="1">
+                <a:solidFill>
+                  <a:srgbClr val="FFFFFF"/>
+                </a:solidFill>
+              </a:defRPr>
+            </a:pPr>
+            <a:r>
+              <a:t>RISC Zero</a:t>
+            </a:r>
+          </a:p>
+        </p:txBody>
+      </p:sp>
+      <p:sp>
+        <p:nvSpPr>
+          <p:cNvPr id="10" name="TextBox 9"/>
+          <p:cNvSpPr txBox="1"/>
+          <p:nvPr/>
+        </p:nvSpPr>
+        <p:spPr>
+          <a:xfrm>
+            <a:off x="640080" y="3749040"/>
+            <a:ext cx="4572000" cy="365760"/>
+          </a:xfrm>
+          <a:prstGeom prst="rect">
+            <a:avLst/>
+          </a:prstGeom>
+          <a:noFill/>
+        </p:spPr>
+        <p:txBody>
+          <a:bodyPr wrap="none">
+            <a:spAutoFit/>
+          </a:bodyPr>
+          <a:lstStyle/>
+          <a:p>
+            <a:pPr>
+              <a:defRPr sz="1400">
+                <a:solidFill>
+                  <a:srgbClr val="DDDDDD"/>
+                </a:solidFill>
+              </a:defRPr>
+            </a:pPr>
+            <a:r>
+              <a:t>RISC-V zkVM, pruebas STARK</a:t>
+            </a:r>
+          </a:p>
+        </p:txBody>
+      </p:sp>
+      <p:sp>
+        <p:nvSpPr>
+          <p:cNvPr id="11" name="Rounded Rectangle 10"/>
+          <p:cNvSpPr/>
+          <p:nvPr/>
+        </p:nvSpPr>
+        <p:spPr>
+          <a:xfrm>
+            <a:off x="457200" y="4297680"/>
+            <a:ext cx="5029200" cy="822960"/>
+          </a:xfrm>
+          <a:prstGeom prst="roundRect">
+            <a:avLst/>
+          </a:prstGeom>
+          <a:solidFill>
+            <a:srgbClr val="2E86AB"/>
+          </a:solidFill>
+          <a:ln>
+            <a:noFill/>
+          </a:ln>
+        </p:spPr>
+        <p:style>
+          <a:lnRef idx="1">
+            <a:schemeClr val="accent1"/>
+          </a:lnRef>
+          <a:fillRef idx="3">
+            <a:schemeClr val="accent1"/>
+          </a:fillRef>
+          <a:effectRef idx="2">
+            <a:schemeClr val="accent1"/>
+          </a:effectRef>
+          <a:fontRef idx="minor">
+            <a:schemeClr val="lt1"/>
+          </a:fontRef>
+        </p:style>
+        <p:txBody>
+          <a:bodyPr rtlCol="0" anchor="ctr"/>
+          <a:lstStyle/>
+          <a:p>
+            <a:pPr algn="ctr"/>
+          </a:p>
+        </p:txBody>
+      </p:sp>
+      <p:sp>
+        <p:nvSpPr>
+          <p:cNvPr id="12" name="TextBox 11"/>
+          <p:cNvSpPr txBox="1"/>
+          <p:nvPr/>
+        </p:nvSpPr>
+        <p:spPr>
+          <a:xfrm>
+            <a:off x="640080" y="4389120"/>
+            <a:ext cx="4572000" cy="365760"/>
+          </a:xfrm>
+          <a:prstGeom prst="rect">
+            <a:avLst/>
+          </a:prstGeom>
+          <a:noFill/>
+        </p:spPr>
+        <p:txBody>
+          <a:bodyPr wrap="none">
+            <a:spAutoFit/>
+          </a:bodyPr>
+          <a:lstStyle/>
+          <a:p>
+            <a:pPr>
+              <a:defRPr sz="1800" b="1">
+                <a:solidFill>
+                  <a:srgbClr val="FFFFFF"/>
+                </a:solidFill>
+              </a:defRPr>
+            </a:pPr>
+            <a:r>
+              <a:t>Valida</a:t>
+            </a:r>
+          </a:p>
+        </p:txBody>
+      </p:sp>
+      <p:sp>
+        <p:nvSpPr>
+          <p:cNvPr id="13" name="TextBox 12"/>
+          <p:cNvSpPr txBox="1"/>
+          <p:nvPr/>
+        </p:nvSpPr>
+        <p:spPr>
+          <a:xfrm>
+            <a:off x="640080" y="4754880"/>
+            <a:ext cx="4572000" cy="365760"/>
+          </a:xfrm>
+          <a:prstGeom prst="rect">
+            <a:avLst/>
+          </a:prstGeom>
+          <a:noFill/>
+        </p:spPr>
+        <p:txBody>
+          <a:bodyPr wrap="none">
+            <a:spAutoFit/>
+          </a:bodyPr>
+          <a:lstStyle/>
+          <a:p>
+            <a:pPr>
+              <a:defRPr sz="1400">
+                <a:solidFill>
+                  <a:srgbClr val="DDDDDD"/>
+                </a:solidFill>
+              </a:defRPr>
+            </a:pPr>
+            <a:r>
+              <a:t>zkVM optimizada para EVM</a:t>
+            </a:r>
+          </a:p>
+        </p:txBody>
+      </p:sp>
+      <p:sp>
+        <p:nvSpPr>
+          <p:cNvPr id="14" name="Rounded Rectangle 13"/>
+          <p:cNvSpPr/>
+          <p:nvPr/>
+        </p:nvSpPr>
+        <p:spPr>
+          <a:xfrm>
+            <a:off x="457200" y="5303520"/>
+            <a:ext cx="5029200" cy="822960"/>
+          </a:xfrm>
+          <a:prstGeom prst="roundRect">
+            <a:avLst/>
+          </a:prstGeom>
+          <a:solidFill>
+            <a:srgbClr val="2E86AB"/>
+          </a:solidFill>
+          <a:ln>
+            <a:noFill/>
+          </a:ln>
+        </p:spPr>
+        <p:style>
+          <a:lnRef idx="1">
+            <a:schemeClr val="accent1"/>
+          </a:lnRef>
+          <a:fillRef idx="3">
+            <a:schemeClr val="accent1"/>
+          </a:fillRef>
+          <a:effectRef idx="2">
+            <a:schemeClr val="accent1"/>
+          </a:effectRef>
+          <a:fontRef idx="minor">
+            <a:schemeClr val="lt1"/>
+          </a:fontRef>
+        </p:style>
+        <p:txBody>
+          <a:bodyPr rtlCol="0" anchor="ctr"/>
+          <a:lstStyle/>
+          <a:p>
+            <a:pPr algn="ctr"/>
+          </a:p>
+        </p:txBody>
+      </p:sp>
+      <p:sp>
+        <p:nvSpPr>
+          <p:cNvPr id="15" name="TextBox 14"/>
+          <p:cNvSpPr txBox="1"/>
+          <p:nvPr/>
+        </p:nvSpPr>
+        <p:spPr>
+          <a:xfrm>
+            <a:off x="640080" y="5394960"/>
+            <a:ext cx="4572000" cy="365760"/>
+          </a:xfrm>
+          <a:prstGeom prst="rect">
+            <a:avLst/>
+          </a:prstGeom>
+          <a:noFill/>
+        </p:spPr>
+        <p:txBody>
+          <a:bodyPr wrap="none">
+            <a:spAutoFit/>
+          </a:bodyPr>
+          <a:lstStyle/>
+          <a:p>
+            <a:pPr>
+              <a:defRPr sz="1800" b="1">
+                <a:solidFill>
+                  <a:srgbClr val="FFFFFF"/>
+                </a:solidFill>
+              </a:defRPr>
+            </a:pPr>
+            <a:r>
+              <a:t>Cairo / Stone</a:t>
+            </a:r>
+          </a:p>
+        </p:txBody>
+      </p:sp>
+      <p:sp>
+        <p:nvSpPr>
+          <p:cNvPr id="16" name="TextBox 15"/>
+          <p:cNvSpPr txBox="1"/>
+          <p:nvPr/>
+        </p:nvSpPr>
+        <p:spPr>
+          <a:xfrm>
+            <a:off x="640080" y="5760720"/>
+            <a:ext cx="4572000" cy="365760"/>
+          </a:xfrm>
+          <a:prstGeom prst="rect">
+            <a:avLst/>
+          </a:prstGeom>
+          <a:noFill/>
+        </p:spPr>
+        <p:txBody>
+          <a:bodyPr wrap="none">
+            <a:spAutoFit/>
+          </a:bodyPr>
+          <a:lstStyle/>
+          <a:p>
+            <a:pPr>
+              <a:defRPr sz="1400">
+                <a:solidFill>
+                  <a:srgbClr val="DDDDDD"/>
+                </a:solidFill>
+              </a:defRPr>
+            </a:pPr>
+            <a:r>
+              <a:t>StarkNet prover, Poseidon-heavy</a:t>
+            </a:r>
+          </a:p>
+        </p:txBody>
+      </p:sp>
+      <p:sp>
+        <p:nvSpPr>
+          <p:cNvPr id="17" name="TextBox 16"/>
+          <p:cNvSpPr txBox="1"/>
+          <p:nvPr/>
+        </p:nvSpPr>
+        <p:spPr>
+          <a:xfrm>
+            <a:off x="5943600" y="2286000"/>
+            <a:ext cx="5486400" cy="457200"/>
+          </a:xfrm>
+          <a:prstGeom prst="rect">
+            <a:avLst/>
+          </a:prstGeom>
+          <a:noFill/>
+        </p:spPr>
+        <p:txBody>
+          <a:bodyPr wrap="none">
+            <a:spAutoFit/>
+          </a:bodyPr>
+          <a:lstStyle/>
+          <a:p>
+            <a:pPr>
+              <a:defRPr sz="2000" b="1">
+                <a:solidFill>
+                  <a:srgbClr val="1A365D"/>
+                </a:solidFill>
+              </a:defRPr>
+            </a:pPr>
+            <a:r>
+              <a:t>AMO-Lean Provee:</a:t>
+            </a:r>
+          </a:p>
+        </p:txBody>
+      </p:sp>
+      <p:sp>
+        <p:nvSpPr>
+          <p:cNvPr id="18" name="TextBox 17"/>
+          <p:cNvSpPr txBox="1"/>
+          <p:nvPr/>
+        </p:nvSpPr>
+        <p:spPr>
+          <a:xfrm>
+            <a:off x="5943600" y="2834640"/>
+            <a:ext cx="5486400" cy="2743200"/>
+          </a:xfrm>
+          <a:prstGeom prst="rect">
+            <a:avLst/>
+          </a:prstGeom>
+          <a:noFill/>
+        </p:spPr>
+        <p:txBody>
+          <a:bodyPr wrap="none">
+            <a:spAutoFit/>
+          </a:bodyPr>
+          <a:lstStyle/>
+          <a:p>
+            <a:pPr>
+              <a:spcAft>
+                <a:spcPts val="1200"/>
+              </a:spcAft>
+              <a:defRPr sz="1800">
+                <a:solidFill>
+                  <a:srgbClr val="2D6A4F"/>
+                </a:solidFill>
+              </a:defRPr>
+            </a:pPr>
+            <a:r>
+              <a:t>✓ FRI fold verificado (STARK core)</a:t>
+            </a:r>
+          </a:p>
+          <a:p>
+            <a:pPr>
+              <a:spcAft>
+                <a:spcPts val="1200"/>
+              </a:spcAft>
+              <a:defRPr sz="1800">
+                <a:solidFill>
+                  <a:srgbClr val="2D6A4F"/>
+                </a:solidFill>
+              </a:defRPr>
+            </a:pPr>
+            <a:r>
+              <a:t>✓ Merkle trees optimizados</a:t>
+            </a:r>
+          </a:p>
+          <a:p>
+            <a:pPr>
+              <a:spcAft>
+                <a:spcPts val="1200"/>
+              </a:spcAft>
+              <a:defRPr sz="1800">
+                <a:solidFill>
+                  <a:srgbClr val="2D6A4F"/>
+                </a:solidFill>
+              </a:defRPr>
+            </a:pPr>
+            <a:r>
+              <a:t>✓ Fiat-Shamir seguro (probado)</a:t>
+            </a:r>
+          </a:p>
+          <a:p>
+            <a:pPr>
+              <a:spcAft>
+                <a:spcPts val="1200"/>
+              </a:spcAft>
+              <a:defRPr sz="1800">
+                <a:solidFill>
+                  <a:srgbClr val="F27F1B"/>
+                </a:solidFill>
+              </a:defRPr>
+            </a:pPr>
+            <a:r>
+              <a:t>→ Poseidon verificado (proximo)</a:t>
+            </a:r>
+          </a:p>
+          <a:p>
+            <a:pPr>
+              <a:spcAft>
+                <a:spcPts val="1200"/>
+              </a:spcAft>
+              <a:defRPr sz="1800">
+                <a:solidFill>
+                  <a:srgbClr val="F27F1B"/>
+                </a:solidFill>
+              </a:defRPr>
+            </a:pPr>
+            <a:r>
+              <a:t>→ GPU kernels verificados (futuro)</a:t>
+            </a:r>
+          </a:p>
+        </p:txBody>
+      </p:sp>
+      <p:sp>
+        <p:nvSpPr>
+          <p:cNvPr id="19" name="TextBox 18"/>
+          <p:cNvSpPr txBox="1"/>
+          <p:nvPr/>
+        </p:nvSpPr>
+        <p:spPr>
+          <a:xfrm>
+            <a:off x="457200" y="5943600"/>
+            <a:ext cx="10972800" cy="640080"/>
+          </a:xfrm>
+          <a:prstGeom prst="rect">
+            <a:avLst/>
+          </a:prstGeom>
+          <a:noFill/>
+        </p:spPr>
+        <p:txBody>
+          <a:bodyPr wrap="none">
+            <a:spAutoFit/>
+          </a:bodyPr>
+          <a:lstStyle/>
+          <a:p>
+            <a:pPr>
+              <a:defRPr sz="1800" b="1">
+                <a:solidFill>
+                  <a:srgbClr val="1A365D"/>
+                </a:solidFill>
+              </a:defRPr>
+            </a:pPr>
+            <a:r>
+              <a:t>Propuesta de valor: Primitivos criptograficos con garantias formales, listos para integracion.</a:t>
             </a:r>
           </a:p>
         </p:txBody>

</xml_diff>